<commit_message>
Added first slide for supaero presentation
</commit_message>
<xml_diff>
--- a/Presentations/Supaero presentation.pptx
+++ b/Presentations/Supaero presentation.pptx
@@ -5,15 +5,16 @@
     <p:sldMasterId id="2147483648" r:id="rId1"/>
   </p:sldMasterIdLst>
   <p:notesMasterIdLst>
-    <p:notesMasterId r:id="rId5"/>
+    <p:notesMasterId r:id="rId6"/>
   </p:notesMasterIdLst>
   <p:handoutMasterIdLst>
-    <p:handoutMasterId r:id="rId6"/>
+    <p:handoutMasterId r:id="rId7"/>
   </p:handoutMasterIdLst>
   <p:sldIdLst>
-    <p:sldId id="257" r:id="rId2"/>
-    <p:sldId id="270" r:id="rId3"/>
-    <p:sldId id="271" r:id="rId4"/>
+    <p:sldId id="273" r:id="rId2"/>
+    <p:sldId id="257" r:id="rId3"/>
+    <p:sldId id="270" r:id="rId4"/>
+    <p:sldId id="271" r:id="rId5"/>
   </p:sldIdLst>
   <p:sldSz cx="12192000" cy="6858000"/>
   <p:notesSz cx="6858000" cy="9144000"/>
@@ -217,7 +218,7 @@
           <a:p>
             <a:fld id="{4EED1B3A-46F9-49FD-AD10-AFD7DDBFFFE7}" type="datetimeFigureOut">
               <a:rPr lang="fr-FR" smtClean="0"/>
-              <a:t>19/09/2019</a:t>
+              <a:t>26/09/2019</a:t>
             </a:fld>
             <a:endParaRPr lang="fr-FR"/>
           </a:p>
@@ -394,7 +395,7 @@
           <a:p>
             <a:fld id="{CBD02DE9-54A9-4CA7-91F3-710D21D0B6EC}" type="datetimeFigureOut">
               <a:rPr lang="en-US" smtClean="0"/>
-              <a:t>9/19/2019</a:t>
+              <a:t>9/26/2019</a:t>
             </a:fld>
             <a:endParaRPr lang="en-US" dirty="0"/>
           </a:p>
@@ -1687,7 +1688,7 @@
               <a:rPr lang="fr-FR" i="0" dirty="0">
                 <a:latin typeface="Arial Nova Light" panose="020B0304020202020204" pitchFamily="34" charset="0"/>
               </a:rPr>
-              <a:t>May 28, 2019</a:t>
+              <a:t>September 26th, 2019</a:t>
             </a:r>
           </a:p>
         </p:txBody>
@@ -3787,6 +3788,170 @@
 </file>
 
 <file path=ppt/slides/slide1.xml><?xml version="1.0" encoding="utf-8"?>
+<p:sld xmlns:a="http://schemas.openxmlformats.org/drawingml/2006/main" xmlns:r="http://schemas.openxmlformats.org/officeDocument/2006/relationships" xmlns:p="http://schemas.openxmlformats.org/presentationml/2006/main">
+  <p:cSld>
+    <p:spTree>
+      <p:nvGrpSpPr>
+        <p:cNvPr id="1" name=""/>
+        <p:cNvGrpSpPr/>
+        <p:nvPr/>
+      </p:nvGrpSpPr>
+      <p:grpSpPr>
+        <a:xfrm>
+          <a:off x="0" y="0"/>
+          <a:ext cx="0" cy="0"/>
+          <a:chOff x="0" y="0"/>
+          <a:chExt cx="0" cy="0"/>
+        </a:xfrm>
+      </p:grpSpPr>
+      <p:sp>
+        <p:nvSpPr>
+          <p:cNvPr id="2" name="Text Placeholder 1">
+            <a:extLst>
+              <a:ext uri="{FF2B5EF4-FFF2-40B4-BE49-F238E27FC236}">
+                <a16:creationId xmlns:a16="http://schemas.microsoft.com/office/drawing/2014/main" id="{150E1CF9-6FB9-471D-8546-AF18B0BFE666}"/>
+              </a:ext>
+            </a:extLst>
+          </p:cNvPr>
+          <p:cNvSpPr>
+            <a:spLocks noGrp="1"/>
+          </p:cNvSpPr>
+          <p:nvPr>
+            <p:ph type="body" sz="quarter" idx="10"/>
+          </p:nvPr>
+        </p:nvSpPr>
+        <p:spPr/>
+        <p:txBody>
+          <a:bodyPr/>
+          <a:lstStyle/>
+          <a:p>
+            <a:r>
+              <a:rPr lang="fr-FR" dirty="0"/>
+              <a:t>ADCS</a:t>
+            </a:r>
+          </a:p>
+        </p:txBody>
+      </p:sp>
+      <p:sp>
+        <p:nvSpPr>
+          <p:cNvPr id="3" name="Text Placeholder 2">
+            <a:extLst>
+              <a:ext uri="{FF2B5EF4-FFF2-40B4-BE49-F238E27FC236}">
+                <a16:creationId xmlns:a16="http://schemas.microsoft.com/office/drawing/2014/main" id="{FA266E3B-43CA-419D-82FC-737EF8C9FE36}"/>
+              </a:ext>
+            </a:extLst>
+          </p:cNvPr>
+          <p:cNvSpPr>
+            <a:spLocks noGrp="1"/>
+          </p:cNvSpPr>
+          <p:nvPr>
+            <p:ph type="body" sz="quarter" idx="11"/>
+          </p:nvPr>
+        </p:nvSpPr>
+        <p:spPr/>
+        <p:txBody>
+          <a:bodyPr/>
+          <a:lstStyle/>
+          <a:p>
+            <a:r>
+              <a:rPr lang="fr-FR" dirty="0"/>
+              <a:t>Cédric BELMANT</a:t>
+            </a:r>
+            <a:br>
+              <a:rPr lang="fr-FR" dirty="0"/>
+            </a:br>
+            <a:r>
+              <a:rPr lang="fr-FR" dirty="0"/>
+              <a:t>Paula MARIN</a:t>
+            </a:r>
+          </a:p>
+        </p:txBody>
+      </p:sp>
+      <p:sp>
+        <p:nvSpPr>
+          <p:cNvPr id="4" name="Slide Number Placeholder 3">
+            <a:extLst>
+              <a:ext uri="{FF2B5EF4-FFF2-40B4-BE49-F238E27FC236}">
+                <a16:creationId xmlns:a16="http://schemas.microsoft.com/office/drawing/2014/main" id="{FCA0FE19-1701-48DB-8FEB-1A584F352D42}"/>
+              </a:ext>
+            </a:extLst>
+          </p:cNvPr>
+          <p:cNvSpPr>
+            <a:spLocks noGrp="1"/>
+          </p:cNvSpPr>
+          <p:nvPr>
+            <p:ph type="sldNum" sz="quarter" idx="12"/>
+          </p:nvPr>
+        </p:nvSpPr>
+        <p:spPr/>
+        <p:txBody>
+          <a:bodyPr/>
+          <a:lstStyle/>
+          <a:p>
+            <a:fld id="{9E937E72-11F5-44A2-9DC0-74EEC05A6D21}" type="slidenum">
+              <a:rPr lang="en-US" smtClean="0"/>
+              <a:pPr/>
+              <a:t>1</a:t>
+            </a:fld>
+            <a:endParaRPr lang="en-US" dirty="0"/>
+          </a:p>
+        </p:txBody>
+      </p:sp>
+      <p:sp>
+        <p:nvSpPr>
+          <p:cNvPr id="5" name="Text Placeholder 4">
+            <a:extLst>
+              <a:ext uri="{FF2B5EF4-FFF2-40B4-BE49-F238E27FC236}">
+                <a16:creationId xmlns:a16="http://schemas.microsoft.com/office/drawing/2014/main" id="{CD50C32F-22DB-403B-956C-FB15F7E299EB}"/>
+              </a:ext>
+            </a:extLst>
+          </p:cNvPr>
+          <p:cNvSpPr>
+            <a:spLocks noGrp="1"/>
+          </p:cNvSpPr>
+          <p:nvPr>
+            <p:ph type="body" sz="quarter" idx="13"/>
+          </p:nvPr>
+        </p:nvSpPr>
+        <p:spPr>
+          <a:xfrm>
+            <a:off x="1519238" y="4802113"/>
+            <a:ext cx="6515100" cy="466212"/>
+          </a:xfrm>
+        </p:spPr>
+        <p:txBody>
+          <a:bodyPr/>
+          <a:lstStyle/>
+          <a:p>
+            <a:pPr marL="0" indent="0" algn="ctr">
+              <a:buNone/>
+            </a:pPr>
+            <a:r>
+              <a:rPr lang="fr-FR" dirty="0"/>
+              <a:t>Subsystem </a:t>
+            </a:r>
+            <a:r>
+              <a:rPr lang="fr-FR" dirty="0" err="1"/>
+              <a:t>overview</a:t>
+            </a:r>
+            <a:endParaRPr lang="fr-FR" dirty="0"/>
+          </a:p>
+        </p:txBody>
+      </p:sp>
+    </p:spTree>
+    <p:extLst>
+      <p:ext uri="{BB962C8B-B14F-4D97-AF65-F5344CB8AC3E}">
+        <p14:creationId xmlns:p14="http://schemas.microsoft.com/office/powerpoint/2010/main" val="439213692"/>
+      </p:ext>
+    </p:extLst>
+  </p:cSld>
+  <p:clrMapOvr>
+    <a:masterClrMapping/>
+  </p:clrMapOvr>
+</p:sld>
+</file>
+
+<file path=ppt/slides/slide2.xml><?xml version="1.0" encoding="utf-8"?>
 <p:sld xmlns:a="http://schemas.openxmlformats.org/drawingml/2006/main" xmlns:r="http://schemas.openxmlformats.org/officeDocument/2006/relationships" xmlns:p="http://schemas.openxmlformats.org/presentationml/2006/main">
   <p:cSld>
     <p:spTree>
@@ -5279,7 +5444,7 @@
 </p:sld>
 </file>
 
-<file path=ppt/slides/slide2.xml><?xml version="1.0" encoding="utf-8"?>
+<file path=ppt/slides/slide3.xml><?xml version="1.0" encoding="utf-8"?>
 <p:sld xmlns:a="http://schemas.openxmlformats.org/drawingml/2006/main" xmlns:r="http://schemas.openxmlformats.org/officeDocument/2006/relationships" xmlns:p="http://schemas.openxmlformats.org/presentationml/2006/main">
   <p:cSld>
     <p:spTree>
@@ -5588,7 +5753,7 @@
 </p:sld>
 </file>
 
-<file path=ppt/slides/slide3.xml><?xml version="1.0" encoding="utf-8"?>
+<file path=ppt/slides/slide4.xml><?xml version="1.0" encoding="utf-8"?>
 <p:sld xmlns:a="http://schemas.openxmlformats.org/drawingml/2006/main" xmlns:r="http://schemas.openxmlformats.org/officeDocument/2006/relationships" xmlns:p="http://schemas.openxmlformats.org/presentationml/2006/main">
   <p:cSld>
     <p:spTree>

</xml_diff>